<commit_message>
change image and some text
</commit_message>
<xml_diff>
--- a/doc/presentation.pptx
+++ b/doc/presentation.pptx
@@ -18,8 +18,8 @@
     <p:sldId id="270" r:id="rId6"/>
     <p:sldId id="261" r:id="rId7"/>
     <p:sldId id="267" r:id="rId8"/>
-    <p:sldId id="263" r:id="rId9"/>
-    <p:sldId id="262" r:id="rId10"/>
+    <p:sldId id="262" r:id="rId9"/>
+    <p:sldId id="263" r:id="rId10"/>
     <p:sldId id="264" r:id="rId11"/>
     <p:sldId id="265" r:id="rId12"/>
     <p:sldId id="266" r:id="rId13"/>
@@ -904,7 +904,7 @@
     </p:spTree>
     <p:extLst>
       <p:ext uri="{BB962C8B-B14F-4D97-AF65-F5344CB8AC3E}">
-        <p14:creationId xmlns:p14="http://schemas.microsoft.com/office/powerpoint/2010/main" val="1936474330"/>
+        <p14:creationId xmlns:p14="http://schemas.microsoft.com/office/powerpoint/2010/main" val="3063915823"/>
       </p:ext>
     </p:extLst>
   </p:cSld>
@@ -988,7 +988,7 @@
     </p:spTree>
     <p:extLst>
       <p:ext uri="{BB962C8B-B14F-4D97-AF65-F5344CB8AC3E}">
-        <p14:creationId xmlns:p14="http://schemas.microsoft.com/office/powerpoint/2010/main" val="3063915823"/>
+        <p14:creationId xmlns:p14="http://schemas.microsoft.com/office/powerpoint/2010/main" val="1936474330"/>
       </p:ext>
     </p:extLst>
   </p:cSld>
@@ -18015,7 +18015,7 @@
           <p:cNvPr id="2" name="Slide Number Placeholder 1">
             <a:extLst>
               <a:ext uri="{FF2B5EF4-FFF2-40B4-BE49-F238E27FC236}">
-                <a16:creationId xmlns:a16="http://schemas.microsoft.com/office/drawing/2014/main" id="{BFEBC4ED-6EFC-C74C-9CD4-140350AB390E}"/>
+                <a16:creationId xmlns:a16="http://schemas.microsoft.com/office/drawing/2014/main" id="{0EF2724E-5507-264F-B1C7-8FD6FD14EEF5}"/>
               </a:ext>
             </a:extLst>
           </p:cNvPr>
@@ -18040,97 +18040,12 @@
           </a:p>
         </p:txBody>
       </p:sp>
-      <p:sp>
-        <p:nvSpPr>
-          <p:cNvPr id="4" name="Text Placeholder 3">
+      <p:pic>
+        <p:nvPicPr>
+          <p:cNvPr id="7" name="Picture Placeholder 6">
             <a:extLst>
               <a:ext uri="{FF2B5EF4-FFF2-40B4-BE49-F238E27FC236}">
-                <a16:creationId xmlns:a16="http://schemas.microsoft.com/office/drawing/2014/main" id="{6D728FEE-2D90-8B4D-A1FC-A0B591B99A07}"/>
-              </a:ext>
-            </a:extLst>
-          </p:cNvPr>
-          <p:cNvSpPr>
-            <a:spLocks noGrp="1"/>
-          </p:cNvSpPr>
-          <p:nvPr>
-            <p:ph type="body" sz="quarter" idx="12"/>
-          </p:nvPr>
-        </p:nvSpPr>
-        <p:spPr/>
-        <p:txBody>
-          <a:bodyPr/>
-          <a:lstStyle/>
-          <a:p>
-            <a:pPr marL="285750" indent="-285750">
-              <a:buFont typeface="Arial" panose="020B0604020202020204" pitchFamily="34" charset="0"/>
-              <a:buChar char="•"/>
-            </a:pPr>
-            <a:endParaRPr lang="en-GB" dirty="0"/>
-          </a:p>
-          <a:p>
-            <a:pPr marL="285750" indent="-285750">
-              <a:buFont typeface="Arial" panose="020B0604020202020204" pitchFamily="34" charset="0"/>
-              <a:buChar char="•"/>
-            </a:pPr>
-            <a:r>
-              <a:rPr lang="en-GB" dirty="0" err="1"/>
-              <a:t>WiFi</a:t>
-            </a:r>
-            <a:r>
-              <a:rPr lang="en-GB" dirty="0"/>
-              <a:t> Settings and Server-Address is c</a:t>
-            </a:r>
-            <a:r>
-              <a:rPr lang="en-CH" dirty="0"/>
-              <a:t>onfigurable through terminal with command «idf.py menuconfig»</a:t>
-            </a:r>
-          </a:p>
-          <a:p>
-            <a:pPr marL="285750" indent="-285750">
-              <a:buFont typeface="Arial" panose="020B0604020202020204" pitchFamily="34" charset="0"/>
-              <a:buChar char="•"/>
-            </a:pPr>
-            <a:r>
-              <a:rPr lang="en-CH" dirty="0"/>
-              <a:t>IDF-Environment required</a:t>
-            </a:r>
-          </a:p>
-        </p:txBody>
-      </p:sp>
-      <p:sp>
-        <p:nvSpPr>
-          <p:cNvPr id="5" name="Title 4">
-            <a:extLst>
-              <a:ext uri="{FF2B5EF4-FFF2-40B4-BE49-F238E27FC236}">
-                <a16:creationId xmlns:a16="http://schemas.microsoft.com/office/drawing/2014/main" id="{5184AAAB-026C-464C-846F-EA22E4B84180}"/>
-              </a:ext>
-            </a:extLst>
-          </p:cNvPr>
-          <p:cNvSpPr>
-            <a:spLocks noGrp="1"/>
-          </p:cNvSpPr>
-          <p:nvPr>
-            <p:ph type="title"/>
-          </p:nvPr>
-        </p:nvSpPr>
-        <p:spPr/>
-        <p:txBody>
-          <a:bodyPr/>
-          <a:lstStyle/>
-          <a:p>
-            <a:r>
-              <a:rPr lang="en-CH" dirty="0"/>
-              <a:t>ESP32 Configuration</a:t>
-            </a:r>
-          </a:p>
-        </p:txBody>
-      </p:sp>
-      <p:pic>
-        <p:nvPicPr>
-          <p:cNvPr id="11" name="Picture Placeholder 10">
-            <a:extLst>
-              <a:ext uri="{FF2B5EF4-FFF2-40B4-BE49-F238E27FC236}">
-                <a16:creationId xmlns:a16="http://schemas.microsoft.com/office/drawing/2014/main" id="{15BDDCCC-5BFF-D243-B542-FFE8D3F0C1C8}"/>
+                <a16:creationId xmlns:a16="http://schemas.microsoft.com/office/drawing/2014/main" id="{26BC1D9D-C949-C943-8C65-04932B6B0051}"/>
               </a:ext>
             </a:extLst>
           </p:cNvPr>
@@ -18149,20 +18064,106 @@
               </a:ext>
             </a:extLst>
           </a:blip>
-          <a:srcRect l="183" r="58104"/>
+          <a:srcRect l="1525" r="23971"/>
           <a:stretch/>
         </p:blipFill>
         <p:spPr>
           <a:xfrm>
             <a:off x="-4762" y="0"/>
-            <a:ext cx="4303712" cy="5145088"/>
+            <a:ext cx="4302000" cy="5145088"/>
           </a:xfrm>
         </p:spPr>
       </p:pic>
+      <p:sp>
+        <p:nvSpPr>
+          <p:cNvPr id="4" name="Text Placeholder 3">
+            <a:extLst>
+              <a:ext uri="{FF2B5EF4-FFF2-40B4-BE49-F238E27FC236}">
+                <a16:creationId xmlns:a16="http://schemas.microsoft.com/office/drawing/2014/main" id="{F8738085-E8CA-AA45-8842-D8E6EC881CFF}"/>
+              </a:ext>
+            </a:extLst>
+          </p:cNvPr>
+          <p:cNvSpPr>
+            <a:spLocks noGrp="1"/>
+          </p:cNvSpPr>
+          <p:nvPr>
+            <p:ph type="body" sz="quarter" idx="12"/>
+          </p:nvPr>
+        </p:nvSpPr>
+        <p:spPr/>
+        <p:txBody>
+          <a:bodyPr/>
+          <a:lstStyle/>
+          <a:p>
+            <a:r>
+              <a:rPr lang="en-GB" dirty="0"/>
+              <a:t>Consists of 3 Basis Modules</a:t>
+            </a:r>
+          </a:p>
+          <a:p>
+            <a:pPr marL="285750" indent="-285750">
+              <a:buFont typeface="Arial" panose="020B0604020202020204" pitchFamily="34" charset="0"/>
+              <a:buChar char="•"/>
+            </a:pPr>
+            <a:r>
+              <a:rPr lang="en-CH" dirty="0"/>
+              <a:t>ADC Reader measure sensors</a:t>
+            </a:r>
+          </a:p>
+          <a:p>
+            <a:pPr marL="285750" indent="-285750">
+              <a:buFont typeface="Arial" panose="020B0604020202020204" pitchFamily="34" charset="0"/>
+              <a:buChar char="•"/>
+            </a:pPr>
+            <a:r>
+              <a:rPr lang="en-CH" dirty="0"/>
+              <a:t>WiFi connector establish connection to an Access Point</a:t>
+            </a:r>
+          </a:p>
+          <a:p>
+            <a:pPr marL="285750" indent="-285750">
+              <a:buFont typeface="Arial" panose="020B0604020202020204" pitchFamily="34" charset="0"/>
+              <a:buChar char="•"/>
+            </a:pPr>
+            <a:r>
+              <a:rPr lang="en-CH" dirty="0"/>
+              <a:t>TCP-Client transmits data through TCP Sockets</a:t>
+            </a:r>
+          </a:p>
+        </p:txBody>
+      </p:sp>
+      <p:sp>
+        <p:nvSpPr>
+          <p:cNvPr id="5" name="Title 4">
+            <a:extLst>
+              <a:ext uri="{FF2B5EF4-FFF2-40B4-BE49-F238E27FC236}">
+                <a16:creationId xmlns:a16="http://schemas.microsoft.com/office/drawing/2014/main" id="{C2226FFE-0BC3-FA41-B583-E73D6AFD0AD1}"/>
+              </a:ext>
+            </a:extLst>
+          </p:cNvPr>
+          <p:cNvSpPr>
+            <a:spLocks noGrp="1"/>
+          </p:cNvSpPr>
+          <p:nvPr>
+            <p:ph type="title"/>
+          </p:nvPr>
+        </p:nvSpPr>
+        <p:spPr/>
+        <p:txBody>
+          <a:bodyPr/>
+          <a:lstStyle/>
+          <a:p>
+            <a:r>
+              <a:rPr lang="en-CH" dirty="0"/>
+              <a:t>ESP32 Application</a:t>
+            </a:r>
+          </a:p>
+        </p:txBody>
+      </p:sp>
     </p:spTree>
     <p:extLst>
       <p:ext uri="{BB962C8B-B14F-4D97-AF65-F5344CB8AC3E}">
-        <p14:creationId xmlns:p14="http://schemas.microsoft.com/office/powerpoint/2010/main" val="2175117835"/>
+        <p14:creationId xmlns:p14="http://schemas.microsoft.com/office/powerpoint/2010/main" val="321649863"/>
       </p:ext>
     </p:extLst>
   </p:cSld>
@@ -18194,7 +18195,7 @@
           <p:cNvPr id="2" name="Slide Number Placeholder 1">
             <a:extLst>
               <a:ext uri="{FF2B5EF4-FFF2-40B4-BE49-F238E27FC236}">
-                <a16:creationId xmlns:a16="http://schemas.microsoft.com/office/drawing/2014/main" id="{0EF2724E-5507-264F-B1C7-8FD6FD14EEF5}"/>
+                <a16:creationId xmlns:a16="http://schemas.microsoft.com/office/drawing/2014/main" id="{BFEBC4ED-6EFC-C74C-9CD4-140350AB390E}"/>
               </a:ext>
             </a:extLst>
           </p:cNvPr>
@@ -18219,12 +18220,86 @@
           </a:p>
         </p:txBody>
       </p:sp>
+      <p:sp>
+        <p:nvSpPr>
+          <p:cNvPr id="4" name="Text Placeholder 3">
+            <a:extLst>
+              <a:ext uri="{FF2B5EF4-FFF2-40B4-BE49-F238E27FC236}">
+                <a16:creationId xmlns:a16="http://schemas.microsoft.com/office/drawing/2014/main" id="{6D728FEE-2D90-8B4D-A1FC-A0B591B99A07}"/>
+              </a:ext>
+            </a:extLst>
+          </p:cNvPr>
+          <p:cNvSpPr>
+            <a:spLocks noGrp="1"/>
+          </p:cNvSpPr>
+          <p:nvPr>
+            <p:ph type="body" sz="quarter" idx="12"/>
+          </p:nvPr>
+        </p:nvSpPr>
+        <p:spPr/>
+        <p:txBody>
+          <a:bodyPr/>
+          <a:lstStyle/>
+          <a:p>
+            <a:pPr marL="285750" indent="-285750">
+              <a:buFont typeface="Arial" panose="020B0604020202020204" pitchFamily="34" charset="0"/>
+              <a:buChar char="•"/>
+            </a:pPr>
+            <a:r>
+              <a:rPr lang="en-GB" dirty="0" err="1"/>
+              <a:t>WiFi</a:t>
+            </a:r>
+            <a:r>
+              <a:rPr lang="en-GB" dirty="0"/>
+              <a:t> Settings</a:t>
+            </a:r>
+          </a:p>
+          <a:p>
+            <a:pPr marL="285750" indent="-285750">
+              <a:buFont typeface="Arial" panose="020B0604020202020204" pitchFamily="34" charset="0"/>
+              <a:buChar char="•"/>
+            </a:pPr>
+            <a:r>
+              <a:rPr lang="en-GB" dirty="0"/>
+              <a:t>Server Address</a:t>
+            </a:r>
+          </a:p>
+        </p:txBody>
+      </p:sp>
+      <p:sp>
+        <p:nvSpPr>
+          <p:cNvPr id="5" name="Title 4">
+            <a:extLst>
+              <a:ext uri="{FF2B5EF4-FFF2-40B4-BE49-F238E27FC236}">
+                <a16:creationId xmlns:a16="http://schemas.microsoft.com/office/drawing/2014/main" id="{5184AAAB-026C-464C-846F-EA22E4B84180}"/>
+              </a:ext>
+            </a:extLst>
+          </p:cNvPr>
+          <p:cNvSpPr>
+            <a:spLocks noGrp="1"/>
+          </p:cNvSpPr>
+          <p:nvPr>
+            <p:ph type="title"/>
+          </p:nvPr>
+        </p:nvSpPr>
+        <p:spPr/>
+        <p:txBody>
+          <a:bodyPr/>
+          <a:lstStyle/>
+          <a:p>
+            <a:r>
+              <a:rPr lang="en-CH" dirty="0"/>
+              <a:t>ESP32 Config</a:t>
+            </a:r>
+          </a:p>
+        </p:txBody>
+      </p:sp>
       <p:pic>
         <p:nvPicPr>
-          <p:cNvPr id="7" name="Picture Placeholder 6">
+          <p:cNvPr id="11" name="Picture Placeholder 10">
             <a:extLst>
               <a:ext uri="{FF2B5EF4-FFF2-40B4-BE49-F238E27FC236}">
-                <a16:creationId xmlns:a16="http://schemas.microsoft.com/office/drawing/2014/main" id="{26BC1D9D-C949-C943-8C65-04932B6B0051}"/>
+                <a16:creationId xmlns:a16="http://schemas.microsoft.com/office/drawing/2014/main" id="{15BDDCCC-5BFF-D243-B542-FFE8D3F0C1C8}"/>
               </a:ext>
             </a:extLst>
           </p:cNvPr>
@@ -18243,7 +18318,7 @@
               </a:ext>
             </a:extLst>
           </a:blip>
-          <a:srcRect l="12776" r="4470"/>
+          <a:srcRect l="183" r="58104"/>
           <a:stretch/>
         </p:blipFill>
         <p:spPr>
@@ -18253,106 +18328,10 @@
           </a:xfrm>
         </p:spPr>
       </p:pic>
-      <p:sp>
-        <p:nvSpPr>
-          <p:cNvPr id="4" name="Text Placeholder 3">
-            <a:extLst>
-              <a:ext uri="{FF2B5EF4-FFF2-40B4-BE49-F238E27FC236}">
-                <a16:creationId xmlns:a16="http://schemas.microsoft.com/office/drawing/2014/main" id="{F8738085-E8CA-AA45-8842-D8E6EC881CFF}"/>
-              </a:ext>
-            </a:extLst>
-          </p:cNvPr>
-          <p:cNvSpPr>
-            <a:spLocks noGrp="1"/>
-          </p:cNvSpPr>
-          <p:nvPr>
-            <p:ph type="body" sz="quarter" idx="12"/>
-          </p:nvPr>
-        </p:nvSpPr>
-        <p:spPr/>
-        <p:txBody>
-          <a:bodyPr/>
-          <a:lstStyle/>
-          <a:p>
-            <a:r>
-              <a:rPr lang="en-GB" dirty="0"/>
-              <a:t>Consists of 3 Basis Modules</a:t>
-            </a:r>
-          </a:p>
-          <a:p>
-            <a:pPr marL="285750" indent="-285750">
-              <a:buFont typeface="Arial" panose="020B0604020202020204" pitchFamily="34" charset="0"/>
-              <a:buChar char="•"/>
-            </a:pPr>
-            <a:r>
-              <a:rPr lang="en-CH" dirty="0"/>
-              <a:t>ADC Reader </a:t>
-            </a:r>
-          </a:p>
-          <a:p>
-            <a:pPr marL="285750" indent="-285750">
-              <a:buFont typeface="Arial" panose="020B0604020202020204" pitchFamily="34" charset="0"/>
-              <a:buChar char="•"/>
-            </a:pPr>
-            <a:r>
-              <a:rPr lang="en-CH" dirty="0"/>
-              <a:t>WiFi connector establish connection to an Access Point</a:t>
-            </a:r>
-          </a:p>
-          <a:p>
-            <a:pPr marL="285750" indent="-285750">
-              <a:buFont typeface="Arial" panose="020B0604020202020204" pitchFamily="34" charset="0"/>
-              <a:buChar char="•"/>
-            </a:pPr>
-            <a:r>
-              <a:rPr lang="en-CH" dirty="0"/>
-              <a:t>TCP-Client transmits data through TCP Sockets</a:t>
-            </a:r>
-          </a:p>
-          <a:p>
-            <a:pPr marL="285750" indent="-285750">
-              <a:buFont typeface="Arial" panose="020B0604020202020204" pitchFamily="34" charset="0"/>
-              <a:buChar char="•"/>
-            </a:pPr>
-            <a:r>
-              <a:rPr lang="en-CH" dirty="0"/>
-              <a:t>Sleep Mode</a:t>
-            </a:r>
-          </a:p>
-        </p:txBody>
-      </p:sp>
-      <p:sp>
-        <p:nvSpPr>
-          <p:cNvPr id="5" name="Title 4">
-            <a:extLst>
-              <a:ext uri="{FF2B5EF4-FFF2-40B4-BE49-F238E27FC236}">
-                <a16:creationId xmlns:a16="http://schemas.microsoft.com/office/drawing/2014/main" id="{C2226FFE-0BC3-FA41-B583-E73D6AFD0AD1}"/>
-              </a:ext>
-            </a:extLst>
-          </p:cNvPr>
-          <p:cNvSpPr>
-            <a:spLocks noGrp="1"/>
-          </p:cNvSpPr>
-          <p:nvPr>
-            <p:ph type="title"/>
-          </p:nvPr>
-        </p:nvSpPr>
-        <p:spPr/>
-        <p:txBody>
-          <a:bodyPr/>
-          <a:lstStyle/>
-          <a:p>
-            <a:r>
-              <a:rPr lang="en-CH" dirty="0"/>
-              <a:t>ESP32 Application</a:t>
-            </a:r>
-          </a:p>
-        </p:txBody>
-      </p:sp>
     </p:spTree>
     <p:extLst>
       <p:ext uri="{BB962C8B-B14F-4D97-AF65-F5344CB8AC3E}">
-        <p14:creationId xmlns:p14="http://schemas.microsoft.com/office/powerpoint/2010/main" val="321649863"/>
+        <p14:creationId xmlns:p14="http://schemas.microsoft.com/office/powerpoint/2010/main" val="2175117835"/>
       </p:ext>
     </p:extLst>
   </p:cSld>

</xml_diff>

<commit_message>
added backend and frontend part to presentation
</commit_message>
<xml_diff>
--- a/doc/presentation.pptx
+++ b/doc/presentation.pptx
@@ -229,7 +229,7 @@
           <a:p>
             <a:fld id="{FD8B9E88-11D9-4CF2-9006-FB7E61EB12D3}" type="datetimeFigureOut">
               <a:rPr lang="de-CH" smtClean="0"/>
-              <a:t>06.01.21</a:t>
+              <a:t>07.01.2021</a:t>
             </a:fld>
             <a:endParaRPr lang="de-CH"/>
           </a:p>
@@ -295,7 +295,7 @@
           <a:p>
             <a:fld id="{2654C08F-5C88-4081-B486-8E61B3DA56B3}" type="slidenum">
               <a:rPr lang="de-CH" smtClean="0"/>
-              <a:t>‹#›</a:t>
+              <a:t>‹Nr.›</a:t>
             </a:fld>
             <a:endParaRPr lang="de-CH"/>
           </a:p>
@@ -394,7 +394,7 @@
           <a:p>
             <a:fld id="{26FCBF76-4842-428B-B9BC-895BFCC1E707}" type="datetimeFigureOut">
               <a:rPr lang="de-CH" smtClean="0"/>
-              <a:t>06.01.21</a:t>
+              <a:t>07.01.2021</a:t>
             </a:fld>
             <a:endParaRPr lang="de-CH"/>
           </a:p>
@@ -553,7 +553,7 @@
           <a:p>
             <a:fld id="{08563647-1664-4460-855C-29C43A086786}" type="slidenum">
               <a:rPr lang="de-CH" smtClean="0"/>
-              <a:t>‹#›</a:t>
+              <a:t>‹Nr.›</a:t>
             </a:fld>
             <a:endParaRPr lang="de-CH"/>
           </a:p>
@@ -2647,7 +2647,7 @@
             <a:fld id="{35052C29-CE5B-4965-8C8E-B011681D2A77}" type="slidenum">
               <a:rPr lang="de-CH" smtClean="0"/>
               <a:pPr/>
-              <a:t>‹#›</a:t>
+              <a:t>‹Nr.›</a:t>
             </a:fld>
             <a:endParaRPr lang="de-CH" dirty="0"/>
           </a:p>
@@ -2778,7 +2778,7 @@
             <a:fld id="{35052C29-CE5B-4965-8C8E-B011681D2A77}" type="slidenum">
               <a:rPr lang="de-CH" smtClean="0"/>
               <a:pPr/>
-              <a:t>‹#›</a:t>
+              <a:t>‹Nr.›</a:t>
             </a:fld>
             <a:endParaRPr lang="de-CH" dirty="0"/>
           </a:p>
@@ -3014,7 +3014,7 @@
             <a:fld id="{35052C29-CE5B-4965-8C8E-B011681D2A77}" type="slidenum">
               <a:rPr lang="de-CH" smtClean="0"/>
               <a:pPr/>
-              <a:t>‹#›</a:t>
+              <a:t>‹Nr.›</a:t>
             </a:fld>
             <a:endParaRPr lang="de-CH" dirty="0"/>
           </a:p>
@@ -3388,7 +3388,7 @@
             <a:fld id="{35052C29-CE5B-4965-8C8E-B011681D2A77}" type="slidenum">
               <a:rPr lang="de-CH" smtClean="0"/>
               <a:pPr/>
-              <a:t>‹#›</a:t>
+              <a:t>‹Nr.›</a:t>
             </a:fld>
             <a:endParaRPr lang="de-CH" dirty="0"/>
           </a:p>
@@ -3554,7 +3554,7 @@
             <a:fld id="{35052C29-CE5B-4965-8C8E-B011681D2A77}" type="slidenum">
               <a:rPr lang="de-CH" smtClean="0"/>
               <a:pPr/>
-              <a:t>‹#›</a:t>
+              <a:t>‹Nr.›</a:t>
             </a:fld>
             <a:endParaRPr lang="de-CH" dirty="0"/>
           </a:p>
@@ -3724,7 +3724,7 @@
             <a:fld id="{35052C29-CE5B-4965-8C8E-B011681D2A77}" type="slidenum">
               <a:rPr lang="de-CH" smtClean="0"/>
               <a:pPr/>
-              <a:t>‹#›</a:t>
+              <a:t>‹Nr.›</a:t>
             </a:fld>
             <a:endParaRPr lang="de-CH" dirty="0"/>
           </a:p>
@@ -3929,7 +3929,7 @@
             <a:fld id="{35052C29-CE5B-4965-8C8E-B011681D2A77}" type="slidenum">
               <a:rPr lang="de-CH" smtClean="0"/>
               <a:pPr/>
-              <a:t>‹#›</a:t>
+              <a:t>‹Nr.›</a:t>
             </a:fld>
             <a:endParaRPr lang="de-CH" dirty="0"/>
           </a:p>
@@ -4435,7 +4435,7 @@
             <a:fld id="{35052C29-CE5B-4965-8C8E-B011681D2A77}" type="slidenum">
               <a:rPr lang="de-CH" smtClean="0"/>
               <a:pPr/>
-              <a:t>‹#›</a:t>
+              <a:t>‹Nr.›</a:t>
             </a:fld>
             <a:endParaRPr lang="de-CH" dirty="0"/>
           </a:p>
@@ -4938,7 +4938,7 @@
             <a:fld id="{35052C29-CE5B-4965-8C8E-B011681D2A77}" type="slidenum">
               <a:rPr lang="de-CH" smtClean="0"/>
               <a:pPr/>
-              <a:t>‹#›</a:t>
+              <a:t>‹Nr.›</a:t>
             </a:fld>
             <a:endParaRPr lang="de-CH" dirty="0"/>
           </a:p>
@@ -5634,7 +5634,7 @@
             <a:fld id="{35052C29-CE5B-4965-8C8E-B011681D2A77}" type="slidenum">
               <a:rPr lang="de-CH" smtClean="0"/>
               <a:pPr/>
-              <a:t>‹#›</a:t>
+              <a:t>‹Nr.›</a:t>
             </a:fld>
             <a:endParaRPr lang="de-CH" dirty="0"/>
           </a:p>
@@ -6314,7 +6314,7 @@
             <a:fld id="{35052C29-CE5B-4965-8C8E-B011681D2A77}" type="slidenum">
               <a:rPr lang="de-CH" smtClean="0"/>
               <a:pPr/>
-              <a:t>‹#›</a:t>
+              <a:t>‹Nr.›</a:t>
             </a:fld>
             <a:endParaRPr lang="de-CH" dirty="0"/>
           </a:p>
@@ -7653,7 +7653,7 @@
             <a:fld id="{35052C29-CE5B-4965-8C8E-B011681D2A77}" type="slidenum">
               <a:rPr lang="de-CH" smtClean="0"/>
               <a:pPr/>
-              <a:t>‹#›</a:t>
+              <a:t>‹Nr.›</a:t>
             </a:fld>
             <a:endParaRPr lang="de-CH" dirty="0"/>
           </a:p>
@@ -8010,7 +8010,7 @@
             <a:fld id="{35052C29-CE5B-4965-8C8E-B011681D2A77}" type="slidenum">
               <a:rPr lang="de-CH" smtClean="0"/>
               <a:pPr/>
-              <a:t>‹#›</a:t>
+              <a:t>‹Nr.›</a:t>
             </a:fld>
             <a:endParaRPr lang="de-CH" dirty="0"/>
           </a:p>
@@ -8290,7 +8290,7 @@
             <a:fld id="{35052C29-CE5B-4965-8C8E-B011681D2A77}" type="slidenum">
               <a:rPr lang="de-CH" smtClean="0"/>
               <a:pPr/>
-              <a:t>‹#›</a:t>
+              <a:t>‹Nr.›</a:t>
             </a:fld>
             <a:endParaRPr lang="de-CH" dirty="0"/>
           </a:p>
@@ -8593,7 +8593,7 @@
             <a:fld id="{35052C29-CE5B-4965-8C8E-B011681D2A77}" type="slidenum">
               <a:rPr lang="de-CH" smtClean="0"/>
               <a:pPr/>
-              <a:t>‹#›</a:t>
+              <a:t>‹Nr.›</a:t>
             </a:fld>
             <a:endParaRPr lang="de-CH" dirty="0"/>
           </a:p>
@@ -8886,7 +8886,7 @@
             <a:fld id="{35052C29-CE5B-4965-8C8E-B011681D2A77}" type="slidenum">
               <a:rPr lang="de-CH" smtClean="0"/>
               <a:pPr/>
-              <a:t>‹#›</a:t>
+              <a:t>‹Nr.›</a:t>
             </a:fld>
             <a:endParaRPr lang="de-CH" dirty="0"/>
           </a:p>
@@ -9191,7 +9191,7 @@
             <a:fld id="{35052C29-CE5B-4965-8C8E-B011681D2A77}" type="slidenum">
               <a:rPr lang="de-CH" smtClean="0"/>
               <a:pPr/>
-              <a:t>‹#›</a:t>
+              <a:t>‹Nr.›</a:t>
             </a:fld>
             <a:endParaRPr lang="de-CH" dirty="0"/>
           </a:p>
@@ -9378,7 +9378,7 @@
             <a:fld id="{35052C29-CE5B-4965-8C8E-B011681D2A77}" type="slidenum">
               <a:rPr lang="de-CH" smtClean="0"/>
               <a:pPr/>
-              <a:t>‹#›</a:t>
+              <a:t>‹Nr.›</a:t>
             </a:fld>
             <a:endParaRPr lang="de-CH" dirty="0"/>
           </a:p>
@@ -10418,7 +10418,7 @@
             <a:fld id="{35052C29-CE5B-4965-8C8E-B011681D2A77}" type="slidenum">
               <a:rPr lang="de-CH" smtClean="0"/>
               <a:pPr/>
-              <a:t>‹#›</a:t>
+              <a:t>‹Nr.›</a:t>
             </a:fld>
             <a:endParaRPr lang="de-CH" dirty="0"/>
           </a:p>
@@ -10797,7 +10797,7 @@
             <a:fld id="{35052C29-CE5B-4965-8C8E-B011681D2A77}" type="slidenum">
               <a:rPr lang="de-CH" smtClean="0"/>
               <a:pPr/>
-              <a:t>‹#›</a:t>
+              <a:t>‹Nr.›</a:t>
             </a:fld>
             <a:endParaRPr lang="de-CH" dirty="0"/>
           </a:p>
@@ -11321,7 +11321,7 @@
             <a:fld id="{35052C29-CE5B-4965-8C8E-B011681D2A77}" type="slidenum">
               <a:rPr lang="de-CH" smtClean="0"/>
               <a:pPr/>
-              <a:t>‹#›</a:t>
+              <a:t>‹Nr.›</a:t>
             </a:fld>
             <a:endParaRPr lang="de-CH" dirty="0"/>
           </a:p>
@@ -11645,7 +11645,7 @@
             <a:fld id="{35052C29-CE5B-4965-8C8E-B011681D2A77}" type="slidenum">
               <a:rPr lang="de-CH" smtClean="0"/>
               <a:pPr/>
-              <a:t>‹#›</a:t>
+              <a:t>‹Nr.›</a:t>
             </a:fld>
             <a:endParaRPr lang="de-CH" dirty="0"/>
           </a:p>
@@ -11939,7 +11939,7 @@
             <a:fld id="{35052C29-CE5B-4965-8C8E-B011681D2A77}" type="slidenum">
               <a:rPr lang="de-CH" smtClean="0"/>
               <a:pPr/>
-              <a:t>‹#›</a:t>
+              <a:t>‹Nr.›</a:t>
             </a:fld>
             <a:endParaRPr lang="de-CH" dirty="0"/>
           </a:p>
@@ -13755,7 +13755,7 @@
             <a:fld id="{35052C29-CE5B-4965-8C8E-B011681D2A77}" type="slidenum">
               <a:rPr lang="de-CH" smtClean="0"/>
               <a:pPr/>
-              <a:t>‹#›</a:t>
+              <a:t>‹Nr.›</a:t>
             </a:fld>
             <a:endParaRPr lang="de-CH" dirty="0"/>
           </a:p>
@@ -15347,7 +15347,7 @@
             <a:fld id="{35052C29-CE5B-4965-8C8E-B011681D2A77}" type="slidenum">
               <a:rPr lang="de-CH" smtClean="0"/>
               <a:pPr/>
-              <a:t>‹#›</a:t>
+              <a:t>‹Nr.›</a:t>
             </a:fld>
             <a:endParaRPr lang="de-CH" dirty="0"/>
           </a:p>
@@ -15671,7 +15671,7 @@
             <a:fld id="{35052C29-CE5B-4965-8C8E-B011681D2A77}" type="slidenum">
               <a:rPr lang="de-CH" smtClean="0"/>
               <a:pPr/>
-              <a:t>‹#›</a:t>
+              <a:t>‹Nr.›</a:t>
             </a:fld>
             <a:endParaRPr lang="de-CH" dirty="0"/>
           </a:p>
@@ -16498,7 +16498,11 @@
             </a:pPr>
             <a:r>
               <a:rPr lang="en-CH" dirty="0"/>
-              <a:t>Implemented in Python</a:t>
+              <a:t>Implemented in</a:t>
+            </a:r>
+            <a:r>
+              <a:rPr lang="de-CH" dirty="0"/>
+              <a:t> .NET Core</a:t>
             </a:r>
           </a:p>
           <a:p>
@@ -16507,13 +16511,30 @@
               <a:buChar char="•"/>
             </a:pPr>
             <a:r>
-              <a:rPr lang="en-GB" dirty="0"/>
-              <a:t>S</a:t>
-            </a:r>
-            <a:r>
-              <a:rPr lang="en-CH" dirty="0"/>
-              <a:t>ends email if threshold is exceeded</a:t>
-            </a:r>
+              <a:rPr lang="de-CH" dirty="0" err="1"/>
+              <a:t>Receives</a:t>
+            </a:r>
+            <a:r>
+              <a:rPr lang="de-CH" dirty="0"/>
+              <a:t> TCP </a:t>
+            </a:r>
+            <a:r>
+              <a:rPr lang="de-CH" dirty="0" err="1"/>
+              <a:t>packages</a:t>
+            </a:r>
+            <a:r>
+              <a:rPr lang="de-CH" dirty="0"/>
+              <a:t> </a:t>
+            </a:r>
+            <a:r>
+              <a:rPr lang="de-CH" dirty="0" err="1"/>
+              <a:t>from</a:t>
+            </a:r>
+            <a:r>
+              <a:rPr lang="de-CH" dirty="0"/>
+              <a:t> ESP32</a:t>
+            </a:r>
+            <a:endParaRPr lang="en-CH" dirty="0"/>
           </a:p>
           <a:p>
             <a:pPr marL="285750" indent="-285750">
@@ -16521,8 +16542,12 @@
               <a:buChar char="•"/>
             </a:pPr>
             <a:r>
+              <a:rPr lang="en-GB" dirty="0"/>
+              <a:t>S</a:t>
+            </a:r>
+            <a:r>
               <a:rPr lang="en-CH" dirty="0"/>
-              <a:t>blabla</a:t>
+              <a:t>ends email if threshold is exceeded</a:t>
             </a:r>
           </a:p>
         </p:txBody>
@@ -16615,24 +16640,37 @@
           </a:p>
         </p:txBody>
       </p:sp>
-      <p:sp>
-        <p:nvSpPr>
-          <p:cNvPr id="3" name="Picture Placeholder 2">
+      <p:pic>
+        <p:nvPicPr>
+          <p:cNvPr id="9" name="Bildplatzhalter 8">
             <a:extLst>
               <a:ext uri="{FF2B5EF4-FFF2-40B4-BE49-F238E27FC236}">
-                <a16:creationId xmlns:a16="http://schemas.microsoft.com/office/drawing/2014/main" id="{49270E32-D3B2-9E4D-AC1F-37827FA31709}"/>
+                <a16:creationId xmlns:a16="http://schemas.microsoft.com/office/drawing/2014/main" id="{82FA9768-FC19-4B86-BD89-638EED0E915F}"/>
               </a:ext>
             </a:extLst>
           </p:cNvPr>
-          <p:cNvSpPr>
-            <a:spLocks noGrp="1"/>
-          </p:cNvSpPr>
+          <p:cNvPicPr>
+            <a:picLocks noGrp="1" noChangeAspect="1"/>
+          </p:cNvPicPr>
           <p:nvPr>
             <p:ph type="pic" sz="quarter" idx="11"/>
           </p:nvPr>
-        </p:nvSpPr>
+        </p:nvPicPr>
+        <p:blipFill>
+          <a:blip r:embed="rId2">
+            <a:extLst>
+              <a:ext uri="{28A0092B-C50C-407E-A947-70E740481C1C}">
+                <a14:useLocalDpi xmlns:a14="http://schemas.microsoft.com/office/drawing/2010/main" val="0"/>
+              </a:ext>
+            </a:extLst>
+          </a:blip>
+          <a:srcRect l="19068" r="19068"/>
+          <a:stretch>
+            <a:fillRect/>
+          </a:stretch>
+        </p:blipFill>
         <p:spPr/>
-      </p:sp>
+      </p:pic>
       <p:sp>
         <p:nvSpPr>
           <p:cNvPr id="4" name="Text Placeholder 3">
@@ -16664,8 +16702,45 @@
             </a:r>
             <a:r>
               <a:rPr lang="en-CH" dirty="0"/>
-              <a:t>hows latest logged measures</a:t>
-            </a:r>
+              <a:t>hows </a:t>
+            </a:r>
+            <a:r>
+              <a:rPr lang="de-CH" dirty="0" err="1"/>
+              <a:t>whole</a:t>
+            </a:r>
+            <a:r>
+              <a:rPr lang="de-CH" dirty="0"/>
+              <a:t> </a:t>
+            </a:r>
+            <a:r>
+              <a:rPr lang="de-CH" dirty="0" err="1"/>
+              <a:t>measurement</a:t>
+            </a:r>
+            <a:r>
+              <a:rPr lang="de-CH" dirty="0"/>
+              <a:t> </a:t>
+            </a:r>
+            <a:r>
+              <a:rPr lang="de-CH" dirty="0" err="1"/>
+              <a:t>history</a:t>
+            </a:r>
+            <a:r>
+              <a:rPr lang="de-CH" dirty="0"/>
+              <a:t> and last 24h </a:t>
+            </a:r>
+            <a:r>
+              <a:rPr lang="de-CH" dirty="0" err="1"/>
+              <a:t>history</a:t>
+            </a:r>
+            <a:r>
+              <a:rPr lang="de-CH" dirty="0"/>
+              <a:t> in a </a:t>
+            </a:r>
+            <a:r>
+              <a:rPr lang="de-CH" dirty="0" err="1"/>
+              <a:t>chart</a:t>
+            </a:r>
+            <a:endParaRPr lang="en-CH" dirty="0"/>
           </a:p>
           <a:p>
             <a:pPr marL="285750" indent="-285750">
@@ -16678,7 +16753,55 @@
             </a:r>
             <a:r>
               <a:rPr lang="en-CH" dirty="0"/>
-              <a:t>mplemented in angular</a:t>
+              <a:t>mplemented in </a:t>
+            </a:r>
+            <a:r>
+              <a:rPr lang="de-CH" dirty="0"/>
+              <a:t>ASP.NET Core</a:t>
+            </a:r>
+          </a:p>
+          <a:p>
+            <a:pPr marL="285750" indent="-285750">
+              <a:buFont typeface="Arial" panose="020B0604020202020204" pitchFamily="34" charset="0"/>
+              <a:buChar char="•"/>
+            </a:pPr>
+            <a:r>
+              <a:rPr lang="de-CH" dirty="0" err="1"/>
+              <a:t>Hosted</a:t>
+            </a:r>
+            <a:r>
+              <a:rPr lang="de-CH" dirty="0"/>
+              <a:t> on Raspberry Pi 0 W</a:t>
+            </a:r>
+          </a:p>
+          <a:p>
+            <a:pPr marL="285750" indent="-285750">
+              <a:buFont typeface="Arial" panose="020B0604020202020204" pitchFamily="34" charset="0"/>
+              <a:buChar char="•"/>
+            </a:pPr>
+            <a:r>
+              <a:rPr lang="de-CH" dirty="0" err="1"/>
+              <a:t>Buildable</a:t>
+            </a:r>
+            <a:r>
+              <a:rPr lang="de-CH" dirty="0"/>
+              <a:t> </a:t>
+            </a:r>
+            <a:r>
+              <a:rPr lang="de-CH" dirty="0" err="1"/>
+              <a:t>for</a:t>
+            </a:r>
+            <a:r>
+              <a:rPr lang="de-CH" dirty="0"/>
+              <a:t> all </a:t>
+            </a:r>
+            <a:r>
+              <a:rPr lang="de-CH" dirty="0" err="1"/>
+              <a:t>plattforms</a:t>
+            </a:r>
+            <a:r>
+              <a:rPr lang="de-CH" dirty="0"/>
+              <a:t> (inclusive Linux)</a:t>
             </a:r>
           </a:p>
         </p:txBody>
@@ -16858,6 +16981,18 @@
               <a:rPr lang="en-CH" dirty="0"/>
               <a:t>Typescript</a:t>
             </a:r>
+            <a:endParaRPr lang="de-CH" dirty="0"/>
+          </a:p>
+          <a:p>
+            <a:pPr marL="285750" indent="-285750">
+              <a:buFont typeface="Arial" panose="020B0604020202020204" pitchFamily="34" charset="0"/>
+              <a:buChar char="•"/>
+            </a:pPr>
+            <a:r>
+              <a:rPr lang="de-CH" dirty="0"/>
+              <a:t>C#</a:t>
+            </a:r>
+            <a:endParaRPr lang="en-CH" dirty="0"/>
           </a:p>
         </p:txBody>
       </p:sp>
@@ -16907,9 +17042,20 @@
               <a:buChar char="•"/>
             </a:pPr>
             <a:r>
-              <a:rPr lang="en-CH" dirty="0"/>
-              <a:t>Angular</a:t>
-            </a:r>
+              <a:rPr lang="de-CH" dirty="0"/>
+              <a:t>.NET Core</a:t>
+            </a:r>
+          </a:p>
+          <a:p>
+            <a:pPr marL="285750" indent="-285750">
+              <a:buFont typeface="Arial" panose="020B0604020202020204" pitchFamily="34" charset="0"/>
+              <a:buChar char="•"/>
+            </a:pPr>
+            <a:r>
+              <a:rPr lang="de-CH" dirty="0"/>
+              <a:t>ASP.NET Core</a:t>
+            </a:r>
+            <a:endParaRPr lang="en-CH" dirty="0"/>
           </a:p>
         </p:txBody>
       </p:sp>
@@ -17938,7 +18084,7 @@
           </p:nvPr>
         </p:nvPicPr>
         <p:blipFill>
-          <a:blip r:embed="rId2">
+          <a:blip r:embed="rId2" cstate="print">
             <a:extLst>
               <a:ext uri="{28A0092B-C50C-407E-A947-70E740481C1C}">
                 <a14:useLocalDpi xmlns:a14="http://schemas.microsoft.com/office/drawing/2010/main" val="0"/>
@@ -18057,7 +18203,7 @@
           </p:nvPr>
         </p:nvPicPr>
         <p:blipFill rotWithShape="1">
-          <a:blip r:embed="rId3">
+          <a:blip r:embed="rId3" cstate="print">
             <a:extLst>
               <a:ext uri="{28A0092B-C50C-407E-A947-70E740481C1C}">
                 <a14:useLocalDpi xmlns:a14="http://schemas.microsoft.com/office/drawing/2010/main" val="0"/>

</xml_diff>